<commit_message>
changed key recognition, now also be able to hold a key. Added movement to the cube of the lwar test with buttons
</commit_message>
<xml_diff>
--- a/Docu/Präsentation_LwAR.pptx
+++ b/Docu/Präsentation_LwAR.pptx
@@ -217,7 +217,7 @@
           <a:p>
             <a:fld id="{F15571A2-EC50-475C-B318-CE84BCE7B47D}" type="datetimeFigureOut">
               <a:rPr lang="de-DE" smtClean="0"/>
-              <a:t>16.01.2017</a:t>
+              <a:t>17.01.2017</a:t>
             </a:fld>
             <a:endParaRPr lang="de-DE"/>
           </a:p>
@@ -3029,7 +3029,7 @@
           <a:p>
             <a:fld id="{5A8D52B4-EE68-48E4-9250-96B075A3601F}" type="datetime1">
               <a:rPr lang="de-DE" smtClean="0"/>
-              <a:t>16.01.2017</a:t>
+              <a:t>17.01.2017</a:t>
             </a:fld>
             <a:endParaRPr lang="de-DE"/>
           </a:p>
@@ -4153,7 +4153,7 @@
           <a:p>
             <a:fld id="{9A1F566C-8DF9-450F-8647-A7073CC22833}" type="datetime1">
               <a:rPr lang="de-DE" smtClean="0"/>
-              <a:t>16.01.2017</a:t>
+              <a:t>17.01.2017</a:t>
             </a:fld>
             <a:endParaRPr lang="de-DE"/>
           </a:p>
@@ -5168,7 +5168,7 @@
           <a:p>
             <a:fld id="{BBB1CD8B-2CD7-438E-B4B4-FE0E9618FC6D}" type="datetime1">
               <a:rPr lang="de-DE" smtClean="0"/>
-              <a:t>16.01.2017</a:t>
+              <a:t>17.01.2017</a:t>
             </a:fld>
             <a:endParaRPr lang="de-DE"/>
           </a:p>
@@ -6342,7 +6342,7 @@
           <a:p>
             <a:fld id="{E39A4E10-FC5A-4094-9729-A4810DD3B038}" type="datetime1">
               <a:rPr lang="de-DE" smtClean="0"/>
-              <a:t>16.01.2017</a:t>
+              <a:t>17.01.2017</a:t>
             </a:fld>
             <a:endParaRPr lang="de-DE"/>
           </a:p>
@@ -7407,7 +7407,7 @@
           <a:p>
             <a:fld id="{80A705BD-1C5F-44D2-AD56-9DB284A93D47}" type="datetime1">
               <a:rPr lang="de-DE" smtClean="0"/>
-              <a:t>16.01.2017</a:t>
+              <a:t>17.01.2017</a:t>
             </a:fld>
             <a:endParaRPr lang="de-DE"/>
           </a:p>
@@ -8057,7 +8057,7 @@
           <a:p>
             <a:fld id="{BD00F8EA-DD15-4097-BEDD-5366F14B294B}" type="datetime1">
               <a:rPr lang="de-DE" smtClean="0"/>
-              <a:t>16.01.2017</a:t>
+              <a:t>17.01.2017</a:t>
             </a:fld>
             <a:endParaRPr lang="de-DE"/>
           </a:p>
@@ -8908,7 +8908,7 @@
           <a:p>
             <a:fld id="{A9BEBE0C-AF58-4BD2-9DE7-888B9EA7B74D}" type="datetime1">
               <a:rPr lang="de-DE" smtClean="0"/>
-              <a:t>16.01.2017</a:t>
+              <a:t>17.01.2017</a:t>
             </a:fld>
             <a:endParaRPr lang="de-DE"/>
           </a:p>
@@ -9087,7 +9087,7 @@
           <a:p>
             <a:fld id="{F092C4FA-BA3B-41B5-B496-A22463A34777}" type="datetime1">
               <a:rPr lang="de-DE" smtClean="0"/>
-              <a:t>16.01.2017</a:t>
+              <a:t>17.01.2017</a:t>
             </a:fld>
             <a:endParaRPr lang="de-DE"/>
           </a:p>
@@ -10089,7 +10089,7 @@
           <a:p>
             <a:fld id="{1CE24504-A0E9-420D-8671-AD174BAF7BE7}" type="datetime1">
               <a:rPr lang="de-DE" smtClean="0"/>
-              <a:t>16.01.2017</a:t>
+              <a:t>17.01.2017</a:t>
             </a:fld>
             <a:endParaRPr lang="de-DE"/>
           </a:p>
@@ -10299,7 +10299,7 @@
           <a:p>
             <a:fld id="{79ECE2FE-5E1F-4466-9368-F5EF11B0EA70}" type="datetime1">
               <a:rPr lang="de-DE" smtClean="0"/>
-              <a:t>16.01.2017</a:t>
+              <a:t>17.01.2017</a:t>
             </a:fld>
             <a:endParaRPr lang="de-DE"/>
           </a:p>
@@ -11370,7 +11370,7 @@
           <a:p>
             <a:fld id="{EA7CA211-A885-45B6-933B-966CBA347BEE}" type="datetime1">
               <a:rPr lang="de-DE" smtClean="0"/>
-              <a:t>16.01.2017</a:t>
+              <a:t>17.01.2017</a:t>
             </a:fld>
             <a:endParaRPr lang="de-DE"/>
           </a:p>
@@ -11646,7 +11646,7 @@
           <a:p>
             <a:fld id="{30D33E8B-E586-4331-9CC3-8863C2A90EE2}" type="datetime1">
               <a:rPr lang="de-DE" smtClean="0"/>
-              <a:t>16.01.2017</a:t>
+              <a:t>17.01.2017</a:t>
             </a:fld>
             <a:endParaRPr lang="de-DE"/>
           </a:p>
@@ -12032,7 +12032,7 @@
           <a:p>
             <a:fld id="{6B88ABCA-AC55-4EA0-B9B7-EF0D82635572}" type="datetime1">
               <a:rPr lang="de-DE" smtClean="0"/>
-              <a:t>16.01.2017</a:t>
+              <a:t>17.01.2017</a:t>
             </a:fld>
             <a:endParaRPr lang="de-DE"/>
           </a:p>
@@ -12154,7 +12154,7 @@
           <a:p>
             <a:fld id="{350B58DB-2170-4F9E-B7D8-D21BB50F64B0}" type="datetime1">
               <a:rPr lang="de-DE" smtClean="0"/>
-              <a:t>16.01.2017</a:t>
+              <a:t>17.01.2017</a:t>
             </a:fld>
             <a:endParaRPr lang="de-DE"/>
           </a:p>
@@ -12253,7 +12253,7 @@
           <a:p>
             <a:fld id="{DCEE0346-DE10-445C-B71D-EBBC9A8AD4B6}" type="datetime1">
               <a:rPr lang="de-DE" smtClean="0"/>
-              <a:t>16.01.2017</a:t>
+              <a:t>17.01.2017</a:t>
             </a:fld>
             <a:endParaRPr lang="de-DE"/>
           </a:p>
@@ -13366,7 +13366,7 @@
           <a:p>
             <a:fld id="{2AA99119-A620-48C0-A759-F2865D977E67}" type="datetime1">
               <a:rPr lang="de-DE" smtClean="0"/>
-              <a:t>16.01.2017</a:t>
+              <a:t>17.01.2017</a:t>
             </a:fld>
             <a:endParaRPr lang="de-DE"/>
           </a:p>
@@ -14503,7 +14503,7 @@
           <a:p>
             <a:fld id="{DB54829E-4F21-40FD-9D0A-45B9DECFAF7C}" type="datetime1">
               <a:rPr lang="de-DE" smtClean="0"/>
-              <a:t>16.01.2017</a:t>
+              <a:t>17.01.2017</a:t>
             </a:fld>
             <a:endParaRPr lang="de-DE"/>
           </a:p>
@@ -15535,7 +15535,7 @@
           <a:p>
             <a:fld id="{A380E4E1-E0F5-4E75-A19F-ED7CC46736CD}" type="datetime1">
               <a:rPr lang="de-DE" smtClean="0"/>
-              <a:t>16.01.2017</a:t>
+              <a:t>17.01.2017</a:t>
             </a:fld>
             <a:endParaRPr lang="de-DE" dirty="0"/>
           </a:p>
@@ -16311,7 +16311,7 @@
           <a:p>
             <a:fld id="{49328BDC-C596-4E55-801E-2FAE970A398D}" type="datetime1">
               <a:rPr lang="de-DE" smtClean="0"/>
-              <a:t>16.01.2017</a:t>
+              <a:t>17.01.2017</a:t>
             </a:fld>
             <a:endParaRPr lang="de-DE"/>
           </a:p>
@@ -16436,7 +16436,7 @@
           <a:p>
             <a:fld id="{49328BDC-C596-4E55-801E-2FAE970A398D}" type="datetime1">
               <a:rPr lang="de-DE" smtClean="0"/>
-              <a:t>16.01.2017</a:t>
+              <a:t>17.01.2017</a:t>
             </a:fld>
             <a:endParaRPr lang="de-DE"/>
           </a:p>
@@ -16597,7 +16597,7 @@
           <a:p>
             <a:fld id="{49328BDC-C596-4E55-801E-2FAE970A398D}" type="datetime1">
               <a:rPr lang="de-DE" smtClean="0"/>
-              <a:t>16.01.2017</a:t>
+              <a:t>17.01.2017</a:t>
             </a:fld>
             <a:endParaRPr lang="de-DE"/>
           </a:p>
@@ -16758,7 +16758,7 @@
           <a:p>
             <a:fld id="{49328BDC-C596-4E55-801E-2FAE970A398D}" type="datetime1">
               <a:rPr lang="de-DE" smtClean="0"/>
-              <a:t>16.01.2017</a:t>
+              <a:t>17.01.2017</a:t>
             </a:fld>
             <a:endParaRPr lang="de-DE"/>
           </a:p>
@@ -16919,7 +16919,7 @@
           <a:p>
             <a:fld id="{49328BDC-C596-4E55-801E-2FAE970A398D}" type="datetime1">
               <a:rPr lang="de-DE" smtClean="0"/>
-              <a:t>16.01.2017</a:t>
+              <a:t>17.01.2017</a:t>
             </a:fld>
             <a:endParaRPr lang="de-DE"/>
           </a:p>
@@ -17080,7 +17080,7 @@
           <a:p>
             <a:fld id="{49328BDC-C596-4E55-801E-2FAE970A398D}" type="datetime1">
               <a:rPr lang="de-DE" smtClean="0"/>
-              <a:t>16.01.2017</a:t>
+              <a:t>17.01.2017</a:t>
             </a:fld>
             <a:endParaRPr lang="de-DE"/>
           </a:p>
@@ -17230,15 +17230,21 @@
           <a:p>
             <a:r>
               <a:rPr lang="de-DE" dirty="0"/>
-              <a:t>Unterstützung von </a:t>
-            </a:r>
-            <a:r>
-              <a:rPr lang="de-DE" dirty="0" err="1"/>
-              <a:t>meheren</a:t>
+              <a:t>Unterstützung </a:t>
+            </a:r>
+            <a:r>
+              <a:rPr lang="de-DE"/>
+              <a:t>von mehreren </a:t>
             </a:r>
             <a:r>
               <a:rPr lang="de-DE" dirty="0"/>
-              <a:t> Lichtquellen</a:t>
+              <a:t>Lichtquellen</a:t>
+            </a:r>
+          </a:p>
+          <a:p>
+            <a:r>
+              <a:rPr lang="de-DE" dirty="0"/>
+              <a:t>Unterstützung Mehr als eine gedrückte Taste</a:t>
             </a:r>
           </a:p>
           <a:p>
@@ -17266,7 +17272,7 @@
           <a:p>
             <a:fld id="{4E57EC31-316A-4592-97B1-60A87D77E01F}" type="datetime1">
               <a:rPr lang="de-DE" smtClean="0"/>
-              <a:t>16.01.2017</a:t>
+              <a:t>17.01.2017</a:t>
             </a:fld>
             <a:endParaRPr lang="de-DE"/>
           </a:p>
@@ -17387,7 +17393,7 @@
           <a:p>
             <a:fld id="{F6A73F07-7947-4C79-8D48-EEFD7183EDF6}" type="datetime1">
               <a:rPr lang="de-DE" smtClean="0"/>
-              <a:t>16.01.2017</a:t>
+              <a:t>17.01.2017</a:t>
             </a:fld>
             <a:endParaRPr lang="de-DE"/>
           </a:p>
@@ -17516,7 +17522,7 @@
           <a:p>
             <a:fld id="{B49D89A0-5304-4B41-917C-2D34B9C54785}" type="datetime1">
               <a:rPr lang="de-DE" smtClean="0"/>
-              <a:t>16.01.2017</a:t>
+              <a:t>17.01.2017</a:t>
             </a:fld>
             <a:endParaRPr lang="de-DE"/>
           </a:p>
@@ -17738,7 +17744,7 @@
           <a:p>
             <a:fld id="{B933DA4C-E278-4424-B240-06D8B28F3414}" type="datetime1">
               <a:rPr lang="de-DE" smtClean="0"/>
-              <a:t>16.01.2017</a:t>
+              <a:t>17.01.2017</a:t>
             </a:fld>
             <a:endParaRPr lang="de-DE"/>
           </a:p>
@@ -17931,7 +17937,7 @@
           <a:p>
             <a:fld id="{49328BDC-C596-4E55-801E-2FAE970A398D}" type="datetime1">
               <a:rPr lang="de-DE" smtClean="0"/>
-              <a:t>16.01.2017</a:t>
+              <a:t>17.01.2017</a:t>
             </a:fld>
             <a:endParaRPr lang="de-DE"/>
           </a:p>
@@ -18024,27 +18030,8 @@
                   </a:schemeClr>
                 </a:solidFill>
               </a:rPr>
-              <a:t> Reality Beispiel, Quelle: </a:t>
-            </a:r>
-            <a:r>
-              <a:rPr lang="de-DE" sz="1200" dirty="0">
-                <a:solidFill>
-                  <a:schemeClr val="tx1">
-                    <a:lumMod val="75000"/>
-                    <a:lumOff val="25000"/>
-                  </a:schemeClr>
-                </a:solidFill>
-              </a:rPr>
-              <a:t>http://media.bemyapp.com/ar-terminator/</a:t>
-            </a:r>
-            <a:endParaRPr lang="de-DE" sz="1200" dirty="0">
-              <a:solidFill>
-                <a:schemeClr val="tx1">
-                  <a:lumMod val="75000"/>
-                  <a:lumOff val="25000"/>
-                </a:schemeClr>
-              </a:solidFill>
-            </a:endParaRPr>
+              <a:t> Reality Beispiel, Quelle: http://media.bemyapp.com/ar-terminator/</a:t>
+            </a:r>
           </a:p>
         </p:txBody>
       </p:sp>
@@ -18290,7 +18277,7 @@
           <a:p>
             <a:fld id="{49328BDC-C596-4E55-801E-2FAE970A398D}" type="datetime1">
               <a:rPr lang="de-DE" smtClean="0"/>
-              <a:t>16.01.2017</a:t>
+              <a:t>17.01.2017</a:t>
             </a:fld>
             <a:endParaRPr lang="de-DE"/>
           </a:p>
@@ -18549,7 +18536,7 @@
           <a:p>
             <a:fld id="{49328BDC-C596-4E55-801E-2FAE970A398D}" type="datetime1">
               <a:rPr lang="de-DE" smtClean="0"/>
-              <a:t>16.01.2017</a:t>
+              <a:t>17.01.2017</a:t>
             </a:fld>
             <a:endParaRPr lang="de-DE"/>
           </a:p>
@@ -18832,7 +18819,7 @@
           <a:p>
             <a:fld id="{49328BDC-C596-4E55-801E-2FAE970A398D}" type="datetime1">
               <a:rPr lang="de-DE" smtClean="0"/>
-              <a:t>16.01.2017</a:t>
+              <a:t>17.01.2017</a:t>
             </a:fld>
             <a:endParaRPr lang="de-DE"/>
           </a:p>
@@ -19093,7 +19080,7 @@
           <a:p>
             <a:fld id="{49328BDC-C596-4E55-801E-2FAE970A398D}" type="datetime1">
               <a:rPr lang="de-DE" smtClean="0"/>
-              <a:t>16.01.2017</a:t>
+              <a:t>17.01.2017</a:t>
             </a:fld>
             <a:endParaRPr lang="de-DE"/>
           </a:p>
@@ -19299,7 +19286,7 @@
           <a:p>
             <a:fld id="{49328BDC-C596-4E55-801E-2FAE970A398D}" type="datetime1">
               <a:rPr lang="de-DE" smtClean="0"/>
-              <a:t>16.01.2017</a:t>
+              <a:t>17.01.2017</a:t>
             </a:fld>
             <a:endParaRPr lang="de-DE"/>
           </a:p>
@@ -20215,11 +20202,7 @@
           <a:p>
             <a:r>
               <a:rPr lang="de-DE" dirty="0"/>
-              <a:t>OpenGL: R</a:t>
-            </a:r>
-            <a:r>
-              <a:rPr lang="de-DE" dirty="0"/>
-              <a:t>echtshändiges Koordinatensystem, (0,0,0) im Zentrum</a:t>
+              <a:t>OpenGL: Rechtshändiges Koordinatensystem, (0,0,0) im Zentrum</a:t>
             </a:r>
           </a:p>
           <a:p>
@@ -20245,7 +20228,6 @@
               <a:rPr lang="de-DE" dirty="0"/>
               <a:t>, 1, 0)</a:t>
             </a:r>
-            <a:endParaRPr lang="de-DE" dirty="0"/>
           </a:p>
           <a:p>
             <a:r>
@@ -20283,7 +20265,7 @@
           <a:p>
             <a:fld id="{49328BDC-C596-4E55-801E-2FAE970A398D}" type="datetime1">
               <a:rPr lang="de-DE" smtClean="0"/>
-              <a:t>16.01.2017</a:t>
+              <a:t>17.01.2017</a:t>
             </a:fld>
             <a:endParaRPr lang="de-DE"/>
           </a:p>

</xml_diff>

<commit_message>
added aruco release libirary, added release configuration + release folder with all dlls
</commit_message>
<xml_diff>
--- a/Docu/Präsentation_LwAR.pptx
+++ b/Docu/Präsentation_LwAR.pptx
@@ -217,7 +217,7 @@
           <a:p>
             <a:fld id="{F15571A2-EC50-475C-B318-CE84BCE7B47D}" type="datetimeFigureOut">
               <a:rPr lang="de-DE" smtClean="0"/>
-              <a:t>17.01.2017</a:t>
+              <a:t>18.01.2017</a:t>
             </a:fld>
             <a:endParaRPr lang="de-DE"/>
           </a:p>
@@ -3029,7 +3029,7 @@
           <a:p>
             <a:fld id="{5A8D52B4-EE68-48E4-9250-96B075A3601F}" type="datetime1">
               <a:rPr lang="de-DE" smtClean="0"/>
-              <a:t>17.01.2017</a:t>
+              <a:t>18.01.2017</a:t>
             </a:fld>
             <a:endParaRPr lang="de-DE"/>
           </a:p>
@@ -4153,7 +4153,7 @@
           <a:p>
             <a:fld id="{9A1F566C-8DF9-450F-8647-A7073CC22833}" type="datetime1">
               <a:rPr lang="de-DE" smtClean="0"/>
-              <a:t>17.01.2017</a:t>
+              <a:t>18.01.2017</a:t>
             </a:fld>
             <a:endParaRPr lang="de-DE"/>
           </a:p>
@@ -5168,7 +5168,7 @@
           <a:p>
             <a:fld id="{BBB1CD8B-2CD7-438E-B4B4-FE0E9618FC6D}" type="datetime1">
               <a:rPr lang="de-DE" smtClean="0"/>
-              <a:t>17.01.2017</a:t>
+              <a:t>18.01.2017</a:t>
             </a:fld>
             <a:endParaRPr lang="de-DE"/>
           </a:p>
@@ -6342,7 +6342,7 @@
           <a:p>
             <a:fld id="{E39A4E10-FC5A-4094-9729-A4810DD3B038}" type="datetime1">
               <a:rPr lang="de-DE" smtClean="0"/>
-              <a:t>17.01.2017</a:t>
+              <a:t>18.01.2017</a:t>
             </a:fld>
             <a:endParaRPr lang="de-DE"/>
           </a:p>
@@ -7407,7 +7407,7 @@
           <a:p>
             <a:fld id="{80A705BD-1C5F-44D2-AD56-9DB284A93D47}" type="datetime1">
               <a:rPr lang="de-DE" smtClean="0"/>
-              <a:t>17.01.2017</a:t>
+              <a:t>18.01.2017</a:t>
             </a:fld>
             <a:endParaRPr lang="de-DE"/>
           </a:p>
@@ -8057,7 +8057,7 @@
           <a:p>
             <a:fld id="{BD00F8EA-DD15-4097-BEDD-5366F14B294B}" type="datetime1">
               <a:rPr lang="de-DE" smtClean="0"/>
-              <a:t>17.01.2017</a:t>
+              <a:t>18.01.2017</a:t>
             </a:fld>
             <a:endParaRPr lang="de-DE"/>
           </a:p>
@@ -8908,7 +8908,7 @@
           <a:p>
             <a:fld id="{A9BEBE0C-AF58-4BD2-9DE7-888B9EA7B74D}" type="datetime1">
               <a:rPr lang="de-DE" smtClean="0"/>
-              <a:t>17.01.2017</a:t>
+              <a:t>18.01.2017</a:t>
             </a:fld>
             <a:endParaRPr lang="de-DE"/>
           </a:p>
@@ -9087,7 +9087,7 @@
           <a:p>
             <a:fld id="{F092C4FA-BA3B-41B5-B496-A22463A34777}" type="datetime1">
               <a:rPr lang="de-DE" smtClean="0"/>
-              <a:t>17.01.2017</a:t>
+              <a:t>18.01.2017</a:t>
             </a:fld>
             <a:endParaRPr lang="de-DE"/>
           </a:p>
@@ -10089,7 +10089,7 @@
           <a:p>
             <a:fld id="{1CE24504-A0E9-420D-8671-AD174BAF7BE7}" type="datetime1">
               <a:rPr lang="de-DE" smtClean="0"/>
-              <a:t>17.01.2017</a:t>
+              <a:t>18.01.2017</a:t>
             </a:fld>
             <a:endParaRPr lang="de-DE"/>
           </a:p>
@@ -10299,7 +10299,7 @@
           <a:p>
             <a:fld id="{79ECE2FE-5E1F-4466-9368-F5EF11B0EA70}" type="datetime1">
               <a:rPr lang="de-DE" smtClean="0"/>
-              <a:t>17.01.2017</a:t>
+              <a:t>18.01.2017</a:t>
             </a:fld>
             <a:endParaRPr lang="de-DE"/>
           </a:p>
@@ -11370,7 +11370,7 @@
           <a:p>
             <a:fld id="{EA7CA211-A885-45B6-933B-966CBA347BEE}" type="datetime1">
               <a:rPr lang="de-DE" smtClean="0"/>
-              <a:t>17.01.2017</a:t>
+              <a:t>18.01.2017</a:t>
             </a:fld>
             <a:endParaRPr lang="de-DE"/>
           </a:p>
@@ -11646,7 +11646,7 @@
           <a:p>
             <a:fld id="{30D33E8B-E586-4331-9CC3-8863C2A90EE2}" type="datetime1">
               <a:rPr lang="de-DE" smtClean="0"/>
-              <a:t>17.01.2017</a:t>
+              <a:t>18.01.2017</a:t>
             </a:fld>
             <a:endParaRPr lang="de-DE"/>
           </a:p>
@@ -12032,7 +12032,7 @@
           <a:p>
             <a:fld id="{6B88ABCA-AC55-4EA0-B9B7-EF0D82635572}" type="datetime1">
               <a:rPr lang="de-DE" smtClean="0"/>
-              <a:t>17.01.2017</a:t>
+              <a:t>18.01.2017</a:t>
             </a:fld>
             <a:endParaRPr lang="de-DE"/>
           </a:p>
@@ -12154,7 +12154,7 @@
           <a:p>
             <a:fld id="{350B58DB-2170-4F9E-B7D8-D21BB50F64B0}" type="datetime1">
               <a:rPr lang="de-DE" smtClean="0"/>
-              <a:t>17.01.2017</a:t>
+              <a:t>18.01.2017</a:t>
             </a:fld>
             <a:endParaRPr lang="de-DE"/>
           </a:p>
@@ -12253,7 +12253,7 @@
           <a:p>
             <a:fld id="{DCEE0346-DE10-445C-B71D-EBBC9A8AD4B6}" type="datetime1">
               <a:rPr lang="de-DE" smtClean="0"/>
-              <a:t>17.01.2017</a:t>
+              <a:t>18.01.2017</a:t>
             </a:fld>
             <a:endParaRPr lang="de-DE"/>
           </a:p>
@@ -13366,7 +13366,7 @@
           <a:p>
             <a:fld id="{2AA99119-A620-48C0-A759-F2865D977E67}" type="datetime1">
               <a:rPr lang="de-DE" smtClean="0"/>
-              <a:t>17.01.2017</a:t>
+              <a:t>18.01.2017</a:t>
             </a:fld>
             <a:endParaRPr lang="de-DE"/>
           </a:p>
@@ -14503,7 +14503,7 @@
           <a:p>
             <a:fld id="{DB54829E-4F21-40FD-9D0A-45B9DECFAF7C}" type="datetime1">
               <a:rPr lang="de-DE" smtClean="0"/>
-              <a:t>17.01.2017</a:t>
+              <a:t>18.01.2017</a:t>
             </a:fld>
             <a:endParaRPr lang="de-DE"/>
           </a:p>
@@ -15535,7 +15535,7 @@
           <a:p>
             <a:fld id="{A380E4E1-E0F5-4E75-A19F-ED7CC46736CD}" type="datetime1">
               <a:rPr lang="de-DE" smtClean="0"/>
-              <a:t>17.01.2017</a:t>
+              <a:t>18.01.2017</a:t>
             </a:fld>
             <a:endParaRPr lang="de-DE" dirty="0"/>
           </a:p>
@@ -16311,7 +16311,7 @@
           <a:p>
             <a:fld id="{49328BDC-C596-4E55-801E-2FAE970A398D}" type="datetime1">
               <a:rPr lang="de-DE" smtClean="0"/>
-              <a:t>17.01.2017</a:t>
+              <a:t>18.01.2017</a:t>
             </a:fld>
             <a:endParaRPr lang="de-DE"/>
           </a:p>
@@ -16436,7 +16436,7 @@
           <a:p>
             <a:fld id="{49328BDC-C596-4E55-801E-2FAE970A398D}" type="datetime1">
               <a:rPr lang="de-DE" smtClean="0"/>
-              <a:t>17.01.2017</a:t>
+              <a:t>18.01.2017</a:t>
             </a:fld>
             <a:endParaRPr lang="de-DE"/>
           </a:p>
@@ -16597,7 +16597,7 @@
           <a:p>
             <a:fld id="{49328BDC-C596-4E55-801E-2FAE970A398D}" type="datetime1">
               <a:rPr lang="de-DE" smtClean="0"/>
-              <a:t>17.01.2017</a:t>
+              <a:t>18.01.2017</a:t>
             </a:fld>
             <a:endParaRPr lang="de-DE"/>
           </a:p>
@@ -16758,7 +16758,7 @@
           <a:p>
             <a:fld id="{49328BDC-C596-4E55-801E-2FAE970A398D}" type="datetime1">
               <a:rPr lang="de-DE" smtClean="0"/>
-              <a:t>17.01.2017</a:t>
+              <a:t>18.01.2017</a:t>
             </a:fld>
             <a:endParaRPr lang="de-DE"/>
           </a:p>
@@ -16919,7 +16919,7 @@
           <a:p>
             <a:fld id="{49328BDC-C596-4E55-801E-2FAE970A398D}" type="datetime1">
               <a:rPr lang="de-DE" smtClean="0"/>
-              <a:t>17.01.2017</a:t>
+              <a:t>18.01.2017</a:t>
             </a:fld>
             <a:endParaRPr lang="de-DE"/>
           </a:p>
@@ -17080,7 +17080,7 @@
           <a:p>
             <a:fld id="{49328BDC-C596-4E55-801E-2FAE970A398D}" type="datetime1">
               <a:rPr lang="de-DE" smtClean="0"/>
-              <a:t>17.01.2017</a:t>
+              <a:t>18.01.2017</a:t>
             </a:fld>
             <a:endParaRPr lang="de-DE"/>
           </a:p>
@@ -17272,7 +17272,7 @@
           <a:p>
             <a:fld id="{4E57EC31-316A-4592-97B1-60A87D77E01F}" type="datetime1">
               <a:rPr lang="de-DE" smtClean="0"/>
-              <a:t>17.01.2017</a:t>
+              <a:t>18.01.2017</a:t>
             </a:fld>
             <a:endParaRPr lang="de-DE"/>
           </a:p>
@@ -17393,7 +17393,7 @@
           <a:p>
             <a:fld id="{F6A73F07-7947-4C79-8D48-EEFD7183EDF6}" type="datetime1">
               <a:rPr lang="de-DE" smtClean="0"/>
-              <a:t>17.01.2017</a:t>
+              <a:t>18.01.2017</a:t>
             </a:fld>
             <a:endParaRPr lang="de-DE"/>
           </a:p>
@@ -17522,7 +17522,7 @@
           <a:p>
             <a:fld id="{B49D89A0-5304-4B41-917C-2D34B9C54785}" type="datetime1">
               <a:rPr lang="de-DE" smtClean="0"/>
-              <a:t>17.01.2017</a:t>
+              <a:t>18.01.2017</a:t>
             </a:fld>
             <a:endParaRPr lang="de-DE"/>
           </a:p>
@@ -17744,7 +17744,7 @@
           <a:p>
             <a:fld id="{B933DA4C-E278-4424-B240-06D8B28F3414}" type="datetime1">
               <a:rPr lang="de-DE" smtClean="0"/>
-              <a:t>17.01.2017</a:t>
+              <a:t>18.01.2017</a:t>
             </a:fld>
             <a:endParaRPr lang="de-DE"/>
           </a:p>
@@ -17937,7 +17937,7 @@
           <a:p>
             <a:fld id="{49328BDC-C596-4E55-801E-2FAE970A398D}" type="datetime1">
               <a:rPr lang="de-DE" smtClean="0"/>
-              <a:t>17.01.2017</a:t>
+              <a:t>18.01.2017</a:t>
             </a:fld>
             <a:endParaRPr lang="de-DE"/>
           </a:p>
@@ -18277,7 +18277,7 @@
           <a:p>
             <a:fld id="{49328BDC-C596-4E55-801E-2FAE970A398D}" type="datetime1">
               <a:rPr lang="de-DE" smtClean="0"/>
-              <a:t>17.01.2017</a:t>
+              <a:t>18.01.2017</a:t>
             </a:fld>
             <a:endParaRPr lang="de-DE"/>
           </a:p>
@@ -18536,7 +18536,7 @@
           <a:p>
             <a:fld id="{49328BDC-C596-4E55-801E-2FAE970A398D}" type="datetime1">
               <a:rPr lang="de-DE" smtClean="0"/>
-              <a:t>17.01.2017</a:t>
+              <a:t>18.01.2017</a:t>
             </a:fld>
             <a:endParaRPr lang="de-DE"/>
           </a:p>
@@ -18784,15 +18784,33 @@
             </a:r>
             <a:r>
               <a:rPr lang="de-DE" dirty="0"/>
-              <a:t>::Object3d</a:t>
-            </a:r>
+              <a:t>::</a:t>
+            </a:r>
+            <a:r>
+              <a:rPr lang="de-DE" dirty="0" err="1"/>
+              <a:t>Camera</a:t>
+            </a:r>
+            <a:endParaRPr lang="de-DE" dirty="0"/>
           </a:p>
           <a:p>
             <a:pPr lvl="1"/>
             <a:r>
               <a:rPr lang="de-DE" dirty="0"/>
-              <a:t>Basisklasse für alle 3D-Objekte der Szene</a:t>
-            </a:r>
+              <a:t>Webcam, Kapselung der </a:t>
+            </a:r>
+            <a:r>
+              <a:rPr lang="de-DE" dirty="0" err="1"/>
+              <a:t>OpenCV</a:t>
+            </a:r>
+            <a:r>
+              <a:rPr lang="de-DE" dirty="0"/>
+              <a:t> Klasse cv::</a:t>
+            </a:r>
+            <a:r>
+              <a:rPr lang="de-DE" dirty="0" err="1"/>
+              <a:t>VideoCapture</a:t>
+            </a:r>
+            <a:endParaRPr lang="de-DE" dirty="0"/>
           </a:p>
           <a:p>
             <a:endParaRPr lang="de-DE" dirty="0"/>
@@ -18819,7 +18837,7 @@
           <a:p>
             <a:fld id="{49328BDC-C596-4E55-801E-2FAE970A398D}" type="datetime1">
               <a:rPr lang="de-DE" smtClean="0"/>
-              <a:t>17.01.2017</a:t>
+              <a:t>18.01.2017</a:t>
             </a:fld>
             <a:endParaRPr lang="de-DE"/>
           </a:p>
@@ -18959,6 +18977,24 @@
             </a:r>
             <a:r>
               <a:rPr lang="de-DE" dirty="0"/>
+              <a:t>::Object3d</a:t>
+            </a:r>
+          </a:p>
+          <a:p>
+            <a:pPr lvl="1"/>
+            <a:r>
+              <a:rPr lang="de-DE" dirty="0"/>
+              <a:t>Basisklasse für alle 3D-Objekte der Szene</a:t>
+            </a:r>
+            <a:endParaRPr lang="de-DE" dirty="0"/>
+          </a:p>
+          <a:p>
+            <a:r>
+              <a:rPr lang="de-DE" dirty="0" err="1"/>
+              <a:t>lwar</a:t>
+            </a:r>
+            <a:r>
+              <a:rPr lang="de-DE" dirty="0"/>
               <a:t>::Material</a:t>
             </a:r>
           </a:p>
@@ -19017,43 +19053,11 @@
             </a:r>
             <a:r>
               <a:rPr lang="de-DE" dirty="0"/>
-              <a:t>::</a:t>
-            </a:r>
-            <a:r>
-              <a:rPr lang="de-DE" dirty="0" err="1"/>
-              <a:t>Camera</a:t>
-            </a:r>
+              <a:t>::Text</a:t>
+            </a:r>
+          </a:p>
+          <a:p>
             <a:endParaRPr lang="de-DE" dirty="0"/>
-          </a:p>
-          <a:p>
-            <a:pPr lvl="1"/>
-            <a:r>
-              <a:rPr lang="de-DE" dirty="0"/>
-              <a:t>Webcam, Kapselung der </a:t>
-            </a:r>
-            <a:r>
-              <a:rPr lang="de-DE" dirty="0" err="1"/>
-              <a:t>OpenCV</a:t>
-            </a:r>
-            <a:r>
-              <a:rPr lang="de-DE" dirty="0"/>
-              <a:t> Klasse cv::</a:t>
-            </a:r>
-            <a:r>
-              <a:rPr lang="de-DE" dirty="0" err="1"/>
-              <a:t>VideoCapture</a:t>
-            </a:r>
-            <a:endParaRPr lang="de-DE" dirty="0"/>
-          </a:p>
-          <a:p>
-            <a:r>
-              <a:rPr lang="de-DE" dirty="0" err="1"/>
-              <a:t>lwar</a:t>
-            </a:r>
-            <a:r>
-              <a:rPr lang="de-DE" dirty="0"/>
-              <a:t>::Text</a:t>
-            </a:r>
           </a:p>
           <a:p>
             <a:endParaRPr lang="de-DE" dirty="0"/>
@@ -19080,7 +19084,7 @@
           <a:p>
             <a:fld id="{49328BDC-C596-4E55-801E-2FAE970A398D}" type="datetime1">
               <a:rPr lang="de-DE" smtClean="0"/>
-              <a:t>17.01.2017</a:t>
+              <a:t>18.01.2017</a:t>
             </a:fld>
             <a:endParaRPr lang="de-DE"/>
           </a:p>
@@ -19232,18 +19236,22 @@
               <a:t>Window</a:t>
             </a:r>
             <a:r>
+              <a:rPr lang="de-DE" dirty="0"/>
+              <a:t> Objekt wird in der Applikation erstellt</a:t>
+            </a:r>
+          </a:p>
+          <a:p>
+            <a:r>
+              <a:rPr lang="de-DE" dirty="0"/>
+              <a:t>Nach allen Vorbereitungen wird der Main-Loop </a:t>
+            </a:r>
+            <a:r>
               <a:rPr lang="de-DE"/>
-              <a:t> Objekt wird </a:t>
+              <a:t>via Start() </a:t>
             </a:r>
             <a:r>
               <a:rPr lang="de-DE" dirty="0"/>
-              <a:t>in der Applikation erstellt</a:t>
-            </a:r>
-          </a:p>
-          <a:p>
-            <a:r>
-              <a:rPr lang="de-DE" dirty="0"/>
-              <a:t>Nach allen Vorbereitungen wird der Main-Loop via Start gestartet</a:t>
+              <a:t>gestartet</a:t>
             </a:r>
           </a:p>
           <a:p>
@@ -19286,7 +19294,7 @@
           <a:p>
             <a:fld id="{49328BDC-C596-4E55-801E-2FAE970A398D}" type="datetime1">
               <a:rPr lang="de-DE" smtClean="0"/>
-              <a:t>17.01.2017</a:t>
+              <a:t>18.01.2017</a:t>
             </a:fld>
             <a:endParaRPr lang="de-DE"/>
           </a:p>
@@ -19938,7 +19946,7 @@
           <p:spPr>
             <a:xfrm>
               <a:off x="8542144" y="2379747"/>
-              <a:ext cx="1704223" cy="355564"/>
+              <a:ext cx="1704223" cy="338554"/>
             </a:xfrm>
             <a:prstGeom prst="rect">
               <a:avLst/>
@@ -19961,7 +19969,29 @@
                     </a:prstClr>
                   </a:solidFill>
                 </a:rPr>
-                <a:t>LwAR</a:t>
+                <a:t>Lwar</a:t>
+              </a:r>
+              <a:r>
+                <a:rPr lang="de-DE" sz="1600" b="1" dirty="0">
+                  <a:solidFill>
+                    <a:prstClr val="black">
+                      <a:lumMod val="75000"/>
+                      <a:lumOff val="25000"/>
+                    </a:prstClr>
+                  </a:solidFill>
+                </a:rPr>
+                <a:t>::</a:t>
+              </a:r>
+              <a:r>
+                <a:rPr lang="de-DE" sz="1600" b="1" dirty="0" err="1">
+                  <a:solidFill>
+                    <a:prstClr val="black">
+                      <a:lumMod val="75000"/>
+                      <a:lumOff val="25000"/>
+                    </a:prstClr>
+                  </a:solidFill>
+                </a:rPr>
+                <a:t>Window</a:t>
               </a:r>
               <a:endParaRPr lang="de-DE" sz="2000" b="1" dirty="0">
                 <a:solidFill>
@@ -20265,7 +20295,7 @@
           <a:p>
             <a:fld id="{49328BDC-C596-4E55-801E-2FAE970A398D}" type="datetime1">
               <a:rPr lang="de-DE" smtClean="0"/>
-              <a:t>17.01.2017</a:t>
+              <a:t>18.01.2017</a:t>
             </a:fld>
             <a:endParaRPr lang="de-DE"/>
           </a:p>

</xml_diff>

<commit_message>
removed un used aruco files
</commit_message>
<xml_diff>
--- a/Docu/Präsentation_LwAR.pptx
+++ b/Docu/Präsentation_LwAR.pptx
@@ -16567,10 +16567,41 @@
           <a:lstStyle/>
           <a:p>
             <a:r>
+              <a:rPr lang="de-DE" dirty="0" err="1">
+                <a:hlinkClick r:id="rId3" action="ppaction://hlinkfile"/>
+              </a:rPr>
+              <a:t>LwARTest</a:t>
+            </a:r>
+            <a:endParaRPr lang="de-DE" dirty="0"/>
+          </a:p>
+          <a:p>
+            <a:pPr lvl="1"/>
+            <a:r>
+              <a:rPr lang="de-DE" dirty="0"/>
+              <a:t>Simples Demo Programm </a:t>
+            </a:r>
+          </a:p>
+          <a:p>
+            <a:pPr lvl="1"/>
+            <a:r>
+              <a:rPr lang="de-DE" dirty="0"/>
+              <a:t>Zeigt einen steuerbaren Würfel und Text</a:t>
+            </a:r>
+          </a:p>
+          <a:p>
+            <a:pPr lvl="1"/>
+            <a:r>
+              <a:rPr lang="de-DE" dirty="0"/>
+              <a:t>Zeigt zusätzlich in neuem </a:t>
+            </a:r>
+            <a:r>
               <a:rPr lang="de-DE" dirty="0" err="1"/>
-              <a:t>LwARTest</a:t>
-            </a:r>
-            <a:endParaRPr lang="de-DE" dirty="0"/>
+              <a:t>OpenCV</a:t>
+            </a:r>
+            <a:r>
+              <a:rPr lang="de-DE" dirty="0"/>
+              <a:t> Fenster Kantendetektion des Webcam-Bildes an</a:t>
+            </a:r>
           </a:p>
           <a:p>
             <a:pPr marL="0" indent="0">
@@ -16728,10 +16759,26 @@
           <a:lstStyle/>
           <a:p>
             <a:r>
-              <a:rPr lang="de-DE" dirty="0" err="1"/>
+              <a:rPr lang="de-DE" dirty="0" err="1">
+                <a:hlinkClick r:id="rId3" action="ppaction://hlinkfile"/>
+              </a:rPr>
               <a:t>LwARTest_DetectFace</a:t>
             </a:r>
             <a:endParaRPr lang="de-DE" dirty="0"/>
+          </a:p>
+          <a:p>
+            <a:pPr lvl="1"/>
+            <a:r>
+              <a:rPr lang="de-DE" dirty="0"/>
+              <a:t>Demo zum Detektieren eines Gesichts</a:t>
+            </a:r>
+          </a:p>
+          <a:p>
+            <a:pPr lvl="1"/>
+            <a:r>
+              <a:rPr lang="de-DE" dirty="0"/>
+              <a:t>3D-Affenkopf wird auf das erkannte Gesicht bewegt</a:t>
+            </a:r>
           </a:p>
           <a:p>
             <a:pPr marL="0" indent="0">
@@ -16889,8 +16936,41 @@
           <a:lstStyle/>
           <a:p>
             <a:r>
+              <a:rPr lang="de-DE" dirty="0" err="1">
+                <a:hlinkClick r:id="rId3" action="ppaction://hlinkfile"/>
+              </a:rPr>
+              <a:t>LwARTest_DetectRedCircles</a:t>
+            </a:r>
+            <a:endParaRPr lang="de-DE" dirty="0"/>
+          </a:p>
+          <a:p>
+            <a:pPr lvl="1"/>
+            <a:r>
+              <a:rPr lang="de-DE" dirty="0"/>
+              <a:t>Erkennung von roten Kreisen mit Hilfe von </a:t>
+            </a:r>
+            <a:r>
               <a:rPr lang="de-DE" dirty="0" err="1"/>
-              <a:t>LwARTest_DetectRedCircles</a:t>
+              <a:t>OpenCV</a:t>
+            </a:r>
+            <a:r>
+              <a:rPr lang="de-DE" dirty="0"/>
+              <a:t> (</a:t>
+            </a:r>
+            <a:r>
+              <a:rPr lang="de-DE" dirty="0" err="1"/>
+              <a:t>HoughCircles</a:t>
+            </a:r>
+            <a:r>
+              <a:rPr lang="de-DE" dirty="0"/>
+              <a:t>)</a:t>
+            </a:r>
+          </a:p>
+          <a:p>
+            <a:pPr lvl="1"/>
+            <a:r>
+              <a:rPr lang="de-DE" dirty="0"/>
+              <a:t>Rendern eines rotierenden Würfels auf jedem erkannten Kreis</a:t>
             </a:r>
             <a:endParaRPr lang="de-DE" dirty="0"/>
           </a:p>
@@ -17050,8 +17130,22 @@
           <a:lstStyle/>
           <a:p>
             <a:r>
+              <a:rPr lang="de-DE" dirty="0" err="1">
+                <a:hlinkClick r:id="rId3" action="ppaction://hlinkfile"/>
+              </a:rPr>
+              <a:t>LwARTest_Marker</a:t>
+            </a:r>
+            <a:endParaRPr lang="de-DE" dirty="0"/>
+          </a:p>
+          <a:p>
+            <a:pPr lvl="1"/>
+            <a:r>
+              <a:rPr lang="de-DE" dirty="0"/>
+              <a:t>Marker Erkennung mit </a:t>
+            </a:r>
+            <a:r>
               <a:rPr lang="de-DE" dirty="0" err="1"/>
-              <a:t>LwARTest_Marker</a:t>
+              <a:t>Aruco</a:t>
             </a:r>
             <a:endParaRPr lang="de-DE" dirty="0"/>
           </a:p>
@@ -17695,7 +17789,7 @@
           <a:p>
             <a:r>
               <a:rPr lang="de-DE" dirty="0"/>
-              <a:t>Ausgangslage</a:t>
+              <a:t>Aufgabenbeschreibung</a:t>
             </a:r>
           </a:p>
           <a:p>
@@ -17883,7 +17977,7 @@
           <a:p>
             <a:r>
               <a:rPr lang="de-DE" dirty="0"/>
-              <a:t>Einfaches und kompaktes Framework für </a:t>
+              <a:t>Erstellung eines einfachen und kompakten Frameworks für </a:t>
             </a:r>
             <a:r>
               <a:rPr lang="de-DE" dirty="0" err="1"/>
@@ -18774,7 +18868,7 @@
             <a:pPr lvl="1"/>
             <a:r>
               <a:rPr lang="de-DE" dirty="0"/>
-              <a:t>Jede Szene hat ein Light, Farbe, Position und </a:t>
+              <a:t>Jede Szene hat ein Light, Farbe, Position und Lichtstärke</a:t>
             </a:r>
           </a:p>
           <a:p>
@@ -18986,7 +19080,6 @@
               <a:rPr lang="de-DE" dirty="0"/>
               <a:t>Basisklasse für alle 3D-Objekte der Szene</a:t>
             </a:r>
-            <a:endParaRPr lang="de-DE" dirty="0"/>
           </a:p>
           <a:p>
             <a:r>
@@ -20248,28 +20341,13 @@
           <a:p>
             <a:r>
               <a:rPr lang="de-DE" dirty="0"/>
-              <a:t>Ränder: (Width / </a:t>
-            </a:r>
-            <a:r>
-              <a:rPr lang="de-DE" dirty="0" err="1"/>
-              <a:t>Aspect</a:t>
-            </a:r>
-            <a:r>
-              <a:rPr lang="de-DE" dirty="0"/>
-              <a:t>, 1, 0)</a:t>
-            </a:r>
-          </a:p>
-          <a:p>
-            <a:r>
-              <a:rPr lang="de-DE" dirty="0"/>
-              <a:t>Kamera befindet sich bei (0,0,3)</a:t>
-            </a:r>
-          </a:p>
-          <a:p>
-            <a:r>
-              <a:rPr lang="de-DE" dirty="0"/>
-              <a:t>Hintergrund muss manuell aktualisiert werden</a:t>
-            </a:r>
+              <a:t>Kamera befindet sich bei (</a:t>
+            </a:r>
+            <a:r>
+              <a:rPr lang="de-DE"/>
+              <a:t>0,0,3)</a:t>
+            </a:r>
+            <a:endParaRPr lang="de-DE" dirty="0"/>
           </a:p>
         </p:txBody>
       </p:sp>

</xml_diff>